<commit_message>
udpate week_02 and pdfs to gitignore
</commit_message>
<xml_diff>
--- a/week_02/week_02.pptx
+++ b/week_02/week_02.pptx
@@ -18,11 +18,9 @@
     <p:sldId id="266" r:id="rId12"/>
     <p:sldId id="267" r:id="rId13"/>
     <p:sldId id="268" r:id="rId14"/>
-    <p:sldId id="269" r:id="rId15"/>
-    <p:sldId id="270" r:id="rId16"/>
-    <p:sldId id="271" r:id="rId17"/>
-    <p:sldId id="272" r:id="rId18"/>
-    <p:sldId id="273" r:id="rId19"/>
+    <p:sldId id="270" r:id="rId15"/>
+    <p:sldId id="272" r:id="rId16"/>
+    <p:sldId id="273" r:id="rId17"/>
   </p:sldIdLst>
   <p:sldSz cx="12192000" cy="6858000"/>
   <p:notesSz cx="6858000" cy="9144000"/>
@@ -297,7 +295,7 @@
           <a:p>
             <a:fld id="{9E016143-E03C-4CFD-AFDC-14E5BDEA754C}" type="datetimeFigureOut">
               <a:rPr lang="en-US" dirty="0"/>
-              <a:t>1/27/16</a:t>
+              <a:t>1/29/16</a:t>
             </a:fld>
             <a:endParaRPr lang="en-US" dirty="0"/>
           </a:p>
@@ -521,7 +519,7 @@
           <a:p>
             <a:fld id="{C033E54A-A8CA-48C1-9504-691B58049D29}" type="datetimeFigureOut">
               <a:rPr lang="en-US" dirty="0"/>
-              <a:t>1/27/16</a:t>
+              <a:t>1/29/16</a:t>
             </a:fld>
             <a:endParaRPr lang="en-US" dirty="0"/>
           </a:p>
@@ -696,7 +694,7 @@
           <a:p>
             <a:fld id="{B5F6C806-BBF7-471C-9527-881CE2266695}" type="datetimeFigureOut">
               <a:rPr lang="en-US" dirty="0"/>
-              <a:t>1/27/16</a:t>
+              <a:t>1/29/16</a:t>
             </a:fld>
             <a:endParaRPr lang="en-US" dirty="0"/>
           </a:p>
@@ -861,7 +859,7 @@
           <a:p>
             <a:fld id="{78C94063-DF36-4330-A365-08DA1FA5B7D6}" type="datetimeFigureOut">
               <a:rPr lang="en-US" dirty="0"/>
-              <a:t>1/27/16</a:t>
+              <a:t>1/29/16</a:t>
             </a:fld>
             <a:endParaRPr lang="en-US" dirty="0"/>
           </a:p>
@@ -1110,7 +1108,7 @@
           <a:p>
             <a:fld id="{908A7C6C-0F39-4D70-8E8D-FE5B9C95FA73}" type="datetimeFigureOut">
               <a:rPr lang="en-US" dirty="0"/>
-              <a:t>1/27/16</a:t>
+              <a:t>1/29/16</a:t>
             </a:fld>
             <a:endParaRPr lang="en-US" dirty="0"/>
           </a:p>
@@ -1431,7 +1429,7 @@
           <a:p>
             <a:fld id="{DFCFA4AC-08CC-42CE-BD01-C191750A04EC}" type="datetimeFigureOut">
               <a:rPr lang="en-US" dirty="0"/>
-              <a:t>1/27/16</a:t>
+              <a:t>1/29/16</a:t>
             </a:fld>
             <a:endParaRPr lang="en-US" dirty="0"/>
           </a:p>
@@ -1877,7 +1875,7 @@
           <a:p>
             <a:fld id="{1BA7A723-92A7-435B-B681-F25B092FEFEB}" type="datetimeFigureOut">
               <a:rPr lang="en-US" dirty="0"/>
-              <a:t>1/27/16</a:t>
+              <a:t>1/29/16</a:t>
             </a:fld>
             <a:endParaRPr lang="en-US" dirty="0"/>
           </a:p>
@@ -1990,7 +1988,7 @@
           <a:p>
             <a:fld id="{4F170639-886C-4FCF-9EAB-ABB5DA3F3F4A}" type="datetimeFigureOut">
               <a:rPr lang="en-US" dirty="0"/>
-              <a:t>1/27/16</a:t>
+              <a:t>1/29/16</a:t>
             </a:fld>
             <a:endParaRPr lang="en-US" dirty="0"/>
           </a:p>
@@ -2080,7 +2078,7 @@
           <a:p>
             <a:fld id="{22230651-31F4-45D2-98AE-A2108F41BC07}" type="datetimeFigureOut">
               <a:rPr lang="en-US" dirty="0"/>
-              <a:t>1/27/16</a:t>
+              <a:t>1/29/16</a:t>
             </a:fld>
             <a:endParaRPr lang="en-US" dirty="0"/>
           </a:p>
@@ -2362,7 +2360,7 @@
           <a:p>
             <a:fld id="{6F53789A-C914-4DB1-8815-80B5EC7335C5}" type="datetimeFigureOut">
               <a:rPr lang="en-US" dirty="0"/>
-              <a:t>1/27/16</a:t>
+              <a:t>1/29/16</a:t>
             </a:fld>
             <a:endParaRPr lang="en-US" dirty="0"/>
           </a:p>
@@ -2682,7 +2680,7 @@
           <a:p>
             <a:fld id="{5E6440AA-91A0-436F-8FDB-C0F939DCAE21}" type="datetimeFigureOut">
               <a:rPr lang="en-US" dirty="0"/>
-              <a:t>1/27/16</a:t>
+              <a:t>1/29/16</a:t>
             </a:fld>
             <a:endParaRPr lang="en-US" dirty="0"/>
           </a:p>
@@ -2931,7 +2929,7 @@
           <a:p>
             <a:fld id="{0E59FD0C-5451-4CA0-86AF-E70AE3279989}" type="datetimeFigureOut">
               <a:rPr lang="en-US" dirty="0"/>
-              <a:t>1/27/16</a:t>
+              <a:t>1/29/16</a:t>
             </a:fld>
             <a:endParaRPr lang="en-US" dirty="0"/>
           </a:p>
@@ -3458,20 +3456,11 @@
               <a:rPr lang="en-US" dirty="0" smtClean="0"/>
               <a:t>Week 2: Flow Control</a:t>
             </a:r>
-            <a:endParaRPr lang="en-US" dirty="0" smtClean="0"/>
           </a:p>
           <a:p>
             <a:r>
               <a:rPr lang="en-US" dirty="0" smtClean="0"/>
-              <a:t>January </a:t>
-            </a:r>
-            <a:r>
-              <a:rPr lang="en-US" dirty="0" smtClean="0"/>
-              <a:t>28, </a:t>
-            </a:r>
-            <a:r>
-              <a:rPr lang="en-US" dirty="0" smtClean="0"/>
-              <a:t>2016</a:t>
+              <a:t>January 28, 2016</a:t>
             </a:r>
             <a:endParaRPr lang="en-US" dirty="0"/>
           </a:p>
@@ -4092,12 +4081,9 @@
           <a:p>
             <a:r>
               <a:rPr lang="en-US" dirty="0" smtClean="0"/>
-              <a:t>Labeled </a:t>
-            </a:r>
-            <a:r>
-              <a:rPr lang="en-US" dirty="0"/>
-              <a:t>Break Statements</a:t>
-            </a:r>
+              <a:t>Continue Statements </a:t>
+            </a:r>
+            <a:endParaRPr lang="en-US" dirty="0"/>
           </a:p>
         </p:txBody>
       </p:sp>
@@ -4118,33 +4104,16 @@
           <a:p>
             <a:r>
               <a:rPr lang="en-US" dirty="0" smtClean="0"/>
-              <a:t>A </a:t>
+              <a:t>The </a:t>
             </a:r>
             <a:r>
               <a:rPr lang="en-US" b="1" dirty="0" smtClean="0"/>
-              <a:t>labeled break</a:t>
+              <a:t>continue</a:t>
             </a:r>
             <a:r>
               <a:rPr lang="en-US" dirty="0" smtClean="0"/>
-              <a:t> statement transfers execution to the first statement after a loop that has been prefixed by a label.</a:t>
-            </a:r>
-          </a:p>
-          <a:p>
-            <a:r>
-              <a:rPr lang="en-US" dirty="0" smtClean="0"/>
-              <a:t>A label is an identifier followed by a colon, e.g. “</a:t>
-            </a:r>
-            <a:r>
-              <a:rPr lang="en-US" i="1" dirty="0" smtClean="0"/>
-              <a:t>label</a:t>
-            </a:r>
-            <a:r>
-              <a:rPr lang="en-US" dirty="0" smtClean="0"/>
-              <a:t>:”.</a:t>
-            </a:r>
-          </a:p>
-          <a:p>
-            <a:endParaRPr lang="en-US" dirty="0" smtClean="0"/>
+              <a:t> statement skips the remainder of a loop’s current iteration, re-evaluates the loop’s Boolean expression, and perform the next iteration of the Boolean expression is true or terminates the loop.</a:t>
+            </a:r>
           </a:p>
           <a:p>
             <a:endParaRPr lang="en-US" dirty="0"/>
@@ -4154,7 +4123,7 @@
     </p:spTree>
     <p:extLst>
       <p:ext uri="{BB962C8B-B14F-4D97-AF65-F5344CB8AC3E}">
-        <p14:creationId xmlns:p14="http://schemas.microsoft.com/office/powerpoint/2010/main" val="1357066227"/>
+        <p14:creationId xmlns:p14="http://schemas.microsoft.com/office/powerpoint/2010/main" val="889050301"/>
       </p:ext>
     </p:extLst>
   </p:cSld>
@@ -4198,830 +4167,6 @@
           <a:p>
             <a:r>
               <a:rPr lang="en-US" dirty="0" smtClean="0"/>
-              <a:t>Continue Statements </a:t>
-            </a:r>
-            <a:endParaRPr lang="en-US" dirty="0"/>
-          </a:p>
-        </p:txBody>
-      </p:sp>
-      <p:sp>
-        <p:nvSpPr>
-          <p:cNvPr id="3" name="Content Placeholder 2"/>
-          <p:cNvSpPr>
-            <a:spLocks noGrp="1"/>
-          </p:cNvSpPr>
-          <p:nvPr>
-            <p:ph idx="1"/>
-          </p:nvPr>
-        </p:nvSpPr>
-        <p:spPr/>
-        <p:txBody>
-          <a:bodyPr anchor="ctr"/>
-          <a:lstStyle/>
-          <a:p>
-            <a:r>
-              <a:rPr lang="en-US" dirty="0" smtClean="0"/>
-              <a:t>The </a:t>
-            </a:r>
-            <a:r>
-              <a:rPr lang="en-US" b="1" dirty="0" smtClean="0"/>
-              <a:t>continue</a:t>
-            </a:r>
-            <a:r>
-              <a:rPr lang="en-US" dirty="0" smtClean="0"/>
-              <a:t> statement skips the remainder of a loop’s current iteration, re-evaluates the loop’s Boolean expression, and perform the next iteration of the Boolean expression is true or terminates the loop.</a:t>
-            </a:r>
-          </a:p>
-          <a:p>
-            <a:endParaRPr lang="en-US" dirty="0"/>
-          </a:p>
-        </p:txBody>
-      </p:sp>
-    </p:spTree>
-    <p:extLst>
-      <p:ext uri="{BB962C8B-B14F-4D97-AF65-F5344CB8AC3E}">
-        <p14:creationId xmlns:p14="http://schemas.microsoft.com/office/powerpoint/2010/main" val="889050301"/>
-      </p:ext>
-    </p:extLst>
-  </p:cSld>
-  <p:clrMapOvr>
-    <a:masterClrMapping/>
-  </p:clrMapOvr>
-</p:sld>
-</file>
-
-<file path=ppt/slides/slide16.xml><?xml version="1.0" encoding="utf-8"?>
-<p:sld xmlns:a="http://schemas.openxmlformats.org/drawingml/2006/main" xmlns:r="http://schemas.openxmlformats.org/officeDocument/2006/relationships" xmlns:p="http://schemas.openxmlformats.org/presentationml/2006/main">
-  <p:cSld>
-    <p:spTree>
-      <p:nvGrpSpPr>
-        <p:cNvPr id="1" name=""/>
-        <p:cNvGrpSpPr/>
-        <p:nvPr/>
-      </p:nvGrpSpPr>
-      <p:grpSpPr>
-        <a:xfrm>
-          <a:off x="0" y="0"/>
-          <a:ext cx="0" cy="0"/>
-          <a:chOff x="0" y="0"/>
-          <a:chExt cx="0" cy="0"/>
-        </a:xfrm>
-      </p:grpSpPr>
-      <p:sp>
-        <p:nvSpPr>
-          <p:cNvPr id="2" name="Title 1"/>
-          <p:cNvSpPr>
-            <a:spLocks noGrp="1"/>
-          </p:cNvSpPr>
-          <p:nvPr>
-            <p:ph type="title"/>
-          </p:nvPr>
-        </p:nvSpPr>
-        <p:spPr>
-          <a:xfrm>
-            <a:off x="1261872" y="365760"/>
-            <a:ext cx="9692640" cy="748337"/>
-          </a:xfrm>
-        </p:spPr>
-        <p:txBody>
-          <a:bodyPr/>
-          <a:lstStyle/>
-          <a:p>
-            <a:r>
-              <a:rPr lang="en-US" dirty="0" smtClean="0"/>
-              <a:t>Labeled Continue Statements</a:t>
-            </a:r>
-            <a:endParaRPr lang="en-US" dirty="0"/>
-          </a:p>
-        </p:txBody>
-      </p:sp>
-      <p:sp>
-        <p:nvSpPr>
-          <p:cNvPr id="3" name="Content Placeholder 2"/>
-          <p:cNvSpPr>
-            <a:spLocks noGrp="1"/>
-          </p:cNvSpPr>
-          <p:nvPr>
-            <p:ph idx="1"/>
-          </p:nvPr>
-        </p:nvSpPr>
-        <p:spPr>
-          <a:xfrm>
-            <a:off x="1261872" y="1114097"/>
-            <a:ext cx="9692640" cy="1156137"/>
-          </a:xfrm>
-        </p:spPr>
-        <p:txBody>
-          <a:bodyPr>
-            <a:normAutofit/>
-          </a:bodyPr>
-          <a:lstStyle/>
-          <a:p>
-            <a:r>
-              <a:rPr lang="en-US" sz="1600" dirty="0" smtClean="0"/>
-              <a:t>A </a:t>
-            </a:r>
-            <a:r>
-              <a:rPr lang="en-US" sz="1600" b="1" dirty="0" smtClean="0"/>
-              <a:t>labeled continue </a:t>
-            </a:r>
-            <a:r>
-              <a:rPr lang="en-US" sz="1600" dirty="0" smtClean="0"/>
-              <a:t>statement skips the remaining iterations of one or more nested loops and transfers execution to the loop prefixed with a a label.</a:t>
-            </a:r>
-          </a:p>
-          <a:p>
-            <a:r>
-              <a:rPr lang="en-US" sz="1600" dirty="0" smtClean="0"/>
-              <a:t>Example with positive difference of two numbers.</a:t>
-            </a:r>
-          </a:p>
-          <a:p>
-            <a:endParaRPr lang="en-US" sz="1600" dirty="0"/>
-          </a:p>
-        </p:txBody>
-      </p:sp>
-      <p:graphicFrame>
-        <p:nvGraphicFramePr>
-          <p:cNvPr id="4" name="Table 3"/>
-          <p:cNvGraphicFramePr>
-            <a:graphicFrameLocks noGrp="1"/>
-          </p:cNvGraphicFramePr>
-          <p:nvPr>
-            <p:extLst>
-              <p:ext uri="{D42A27DB-BD31-4B8C-83A1-F6EECF244321}">
-                <p14:modId xmlns:p14="http://schemas.microsoft.com/office/powerpoint/2010/main" val="235433005"/>
-              </p:ext>
-            </p:extLst>
-          </p:nvPr>
-        </p:nvGraphicFramePr>
-        <p:xfrm>
-          <a:off x="1261872" y="2270234"/>
-          <a:ext cx="9692640" cy="3850048"/>
-        </p:xfrm>
-        <a:graphic>
-          <a:graphicData uri="http://schemas.openxmlformats.org/drawingml/2006/table">
-            <a:tbl>
-              <a:tblPr firstRow="1" bandRow="1">
-                <a:tableStyleId>{5C22544A-7EE6-4342-B048-85BDC9FD1C3A}</a:tableStyleId>
-              </a:tblPr>
-              <a:tblGrid>
-                <a:gridCol w="997852"/>
-                <a:gridCol w="977462"/>
-                <a:gridCol w="1524000"/>
-                <a:gridCol w="6193326"/>
-              </a:tblGrid>
-              <a:tr h="346598">
-                <a:tc>
-                  <a:txBody>
-                    <a:bodyPr/>
-                    <a:lstStyle/>
-                    <a:p>
-                      <a:r>
-                        <a:rPr lang="en-US" sz="1400" dirty="0" smtClean="0"/>
-                        <a:t>First Number</a:t>
-                      </a:r>
-                      <a:endParaRPr lang="en-US" sz="1400" dirty="0"/>
-                    </a:p>
-                  </a:txBody>
-                  <a:tcPr/>
-                </a:tc>
-                <a:tc>
-                  <a:txBody>
-                    <a:bodyPr/>
-                    <a:lstStyle/>
-                    <a:p>
-                      <a:r>
-                        <a:rPr lang="en-US" sz="1400" dirty="0" smtClean="0"/>
-                        <a:t>Second Number</a:t>
-                      </a:r>
-                      <a:endParaRPr lang="en-US" sz="1400" dirty="0"/>
-                    </a:p>
-                  </a:txBody>
-                  <a:tcPr/>
-                </a:tc>
-                <a:tc>
-                  <a:txBody>
-                    <a:bodyPr/>
-                    <a:lstStyle/>
-                    <a:p>
-                      <a:r>
-                        <a:rPr lang="en-US" sz="1400" dirty="0" smtClean="0"/>
-                        <a:t>Difference</a:t>
-                      </a:r>
-                      <a:endParaRPr lang="en-US" sz="1400" dirty="0"/>
-                    </a:p>
-                  </a:txBody>
-                  <a:tcPr/>
-                </a:tc>
-                <a:tc>
-                  <a:txBody>
-                    <a:bodyPr/>
-                    <a:lstStyle/>
-                    <a:p>
-                      <a:r>
-                        <a:rPr lang="en-US" sz="1400" dirty="0" smtClean="0"/>
-                        <a:t>Outcome</a:t>
-                      </a:r>
-                      <a:endParaRPr lang="en-US" sz="1400" dirty="0"/>
-                    </a:p>
-                  </a:txBody>
-                  <a:tcPr/>
-                </a:tc>
-              </a:tr>
-              <a:tr h="444352">
-                <a:tc>
-                  <a:txBody>
-                    <a:bodyPr/>
-                    <a:lstStyle/>
-                    <a:p>
-                      <a:r>
-                        <a:rPr lang="en-US" sz="1400" dirty="0" smtClean="0"/>
-                        <a:t>1</a:t>
-                      </a:r>
-                      <a:endParaRPr lang="en-US" sz="1400" dirty="0"/>
-                    </a:p>
-                  </a:txBody>
-                  <a:tcPr/>
-                </a:tc>
-                <a:tc>
-                  <a:txBody>
-                    <a:bodyPr/>
-                    <a:lstStyle/>
-                    <a:p>
-                      <a:r>
-                        <a:rPr lang="en-US" sz="1400" dirty="0" smtClean="0"/>
-                        <a:t>1</a:t>
-                      </a:r>
-                      <a:endParaRPr lang="en-US" sz="1400" dirty="0"/>
-                    </a:p>
-                  </a:txBody>
-                  <a:tcPr/>
-                </a:tc>
-                <a:tc>
-                  <a:txBody>
-                    <a:bodyPr/>
-                    <a:lstStyle/>
-                    <a:p>
-                      <a:r>
-                        <a:rPr lang="en-US" sz="1400" dirty="0" smtClean="0"/>
-                        <a:t>Not</a:t>
-                      </a:r>
-                      <a:r>
-                        <a:rPr lang="en-US" sz="1400" baseline="0" dirty="0" smtClean="0"/>
-                        <a:t> Positive</a:t>
-                      </a:r>
-                      <a:endParaRPr lang="en-US" sz="1400" dirty="0"/>
-                    </a:p>
-                  </a:txBody>
-                  <a:tcPr/>
-                </a:tc>
-                <a:tc>
-                  <a:txBody>
-                    <a:bodyPr/>
-                    <a:lstStyle/>
-                    <a:p>
-                      <a:r>
-                        <a:rPr lang="en-US" sz="1400" dirty="0" smtClean="0"/>
-                        <a:t>Don</a:t>
-                      </a:r>
-                      <a:r>
-                        <a:rPr lang="uk-UA" sz="1400" dirty="0" smtClean="0"/>
-                        <a:t>’</a:t>
-                      </a:r>
-                      <a:r>
-                        <a:rPr lang="en-US" sz="1400" dirty="0" smtClean="0"/>
-                        <a:t>t</a:t>
-                      </a:r>
-                      <a:r>
-                        <a:rPr lang="en-US" sz="1400" baseline="0" dirty="0" smtClean="0"/>
-                        <a:t> display this and move on to the next value for both first and second numbers</a:t>
-                      </a:r>
-                      <a:endParaRPr lang="en-US" sz="1400" dirty="0"/>
-                    </a:p>
-                  </a:txBody>
-                  <a:tcPr/>
-                </a:tc>
-              </a:tr>
-              <a:tr h="444352">
-                <a:tc>
-                  <a:txBody>
-                    <a:bodyPr/>
-                    <a:lstStyle/>
-                    <a:p>
-                      <a:r>
-                        <a:rPr lang="en-US" sz="1400" dirty="0" smtClean="0"/>
-                        <a:t>2</a:t>
-                      </a:r>
-                      <a:endParaRPr lang="en-US" sz="1400" dirty="0"/>
-                    </a:p>
-                  </a:txBody>
-                  <a:tcPr/>
-                </a:tc>
-                <a:tc>
-                  <a:txBody>
-                    <a:bodyPr/>
-                    <a:lstStyle/>
-                    <a:p>
-                      <a:r>
-                        <a:rPr lang="en-US" sz="1400" dirty="0" smtClean="0"/>
-                        <a:t>1</a:t>
-                      </a:r>
-                      <a:endParaRPr lang="en-US" sz="1400" dirty="0"/>
-                    </a:p>
-                  </a:txBody>
-                  <a:tcPr/>
-                </a:tc>
-                <a:tc>
-                  <a:txBody>
-                    <a:bodyPr/>
-                    <a:lstStyle/>
-                    <a:p>
-                      <a:r>
-                        <a:rPr lang="en-US" sz="1400" baseline="0" dirty="0" smtClean="0"/>
-                        <a:t>Positive</a:t>
-                      </a:r>
-                      <a:endParaRPr lang="en-US" sz="1400" dirty="0"/>
-                    </a:p>
-                  </a:txBody>
-                  <a:tcPr/>
-                </a:tc>
-                <a:tc>
-                  <a:txBody>
-                    <a:bodyPr/>
-                    <a:lstStyle/>
-                    <a:p>
-                      <a:r>
-                        <a:rPr lang="en-US" sz="1400" dirty="0" smtClean="0"/>
-                        <a:t>Display this and move on to the next</a:t>
-                      </a:r>
-                      <a:r>
-                        <a:rPr lang="en-US" sz="1400" baseline="0" dirty="0" smtClean="0"/>
-                        <a:t> value for the second number</a:t>
-                      </a:r>
-                      <a:endParaRPr lang="en-US" sz="1400" dirty="0"/>
-                    </a:p>
-                  </a:txBody>
-                  <a:tcPr/>
-                </a:tc>
-              </a:tr>
-              <a:tr h="444352">
-                <a:tc>
-                  <a:txBody>
-                    <a:bodyPr/>
-                    <a:lstStyle/>
-                    <a:p>
-                      <a:r>
-                        <a:rPr lang="en-US" sz="1400" dirty="0" smtClean="0"/>
-                        <a:t>2</a:t>
-                      </a:r>
-                      <a:endParaRPr lang="en-US" sz="1400" dirty="0"/>
-                    </a:p>
-                  </a:txBody>
-                  <a:tcPr/>
-                </a:tc>
-                <a:tc>
-                  <a:txBody>
-                    <a:bodyPr/>
-                    <a:lstStyle/>
-                    <a:p>
-                      <a:r>
-                        <a:rPr lang="en-US" sz="1400" dirty="0" smtClean="0"/>
-                        <a:t>2</a:t>
-                      </a:r>
-                      <a:endParaRPr lang="en-US" sz="1400" dirty="0"/>
-                    </a:p>
-                  </a:txBody>
-                  <a:tcPr/>
-                </a:tc>
-                <a:tc>
-                  <a:txBody>
-                    <a:bodyPr/>
-                    <a:lstStyle/>
-                    <a:p>
-                      <a:r>
-                        <a:rPr lang="en-US" sz="1400" dirty="0" smtClean="0"/>
-                        <a:t>Not</a:t>
-                      </a:r>
-                      <a:r>
-                        <a:rPr lang="en-US" sz="1400" baseline="0" dirty="0" smtClean="0"/>
-                        <a:t> </a:t>
-                      </a:r>
-                      <a:r>
-                        <a:rPr lang="en-US" sz="1400" baseline="0" dirty="0" smtClean="0"/>
-                        <a:t>Positive</a:t>
-                      </a:r>
-                      <a:endParaRPr lang="en-US" sz="1400" dirty="0"/>
-                    </a:p>
-                  </a:txBody>
-                  <a:tcPr/>
-                </a:tc>
-                <a:tc>
-                  <a:txBody>
-                    <a:bodyPr/>
-                    <a:lstStyle/>
-                    <a:p>
-                      <a:r>
-                        <a:rPr lang="en-US" sz="1400" dirty="0" smtClean="0"/>
-                        <a:t>Don</a:t>
-                      </a:r>
-                      <a:r>
-                        <a:rPr lang="uk-UA" sz="1400" dirty="0" smtClean="0"/>
-                        <a:t>’</a:t>
-                      </a:r>
-                      <a:r>
-                        <a:rPr lang="en-US" sz="1400" dirty="0" smtClean="0"/>
-                        <a:t>t</a:t>
-                      </a:r>
-                      <a:r>
-                        <a:rPr lang="en-US" sz="1400" baseline="0" dirty="0" smtClean="0"/>
-                        <a:t> display this and move on to the next value for both first and second numbers</a:t>
-                      </a:r>
-                      <a:endParaRPr lang="en-US" sz="1400" dirty="0"/>
-                    </a:p>
-                  </a:txBody>
-                  <a:tcPr/>
-                </a:tc>
-              </a:tr>
-              <a:tr h="444352">
-                <a:tc>
-                  <a:txBody>
-                    <a:bodyPr/>
-                    <a:lstStyle/>
-                    <a:p>
-                      <a:r>
-                        <a:rPr lang="en-US" sz="1400" dirty="0" smtClean="0"/>
-                        <a:t>3</a:t>
-                      </a:r>
-                      <a:endParaRPr lang="en-US" sz="1400" dirty="0"/>
-                    </a:p>
-                  </a:txBody>
-                  <a:tcPr/>
-                </a:tc>
-                <a:tc>
-                  <a:txBody>
-                    <a:bodyPr/>
-                    <a:lstStyle/>
-                    <a:p>
-                      <a:r>
-                        <a:rPr lang="en-US" sz="1400" dirty="0" smtClean="0"/>
-                        <a:t>1</a:t>
-                      </a:r>
-                      <a:endParaRPr lang="en-US" sz="1400" dirty="0"/>
-                    </a:p>
-                  </a:txBody>
-                  <a:tcPr/>
-                </a:tc>
-                <a:tc>
-                  <a:txBody>
-                    <a:bodyPr/>
-                    <a:lstStyle/>
-                    <a:p>
-                      <a:r>
-                        <a:rPr lang="en-US" sz="1400" baseline="0" dirty="0" smtClean="0"/>
-                        <a:t>Positive</a:t>
-                      </a:r>
-                      <a:endParaRPr lang="en-US" sz="1400" dirty="0"/>
-                    </a:p>
-                  </a:txBody>
-                  <a:tcPr/>
-                </a:tc>
-                <a:tc>
-                  <a:txBody>
-                    <a:bodyPr/>
-                    <a:lstStyle/>
-                    <a:p>
-                      <a:pPr marL="0" marR="0" indent="0" algn="l" defTabSz="914400" rtl="0" eaLnBrk="1" fontAlgn="auto" latinLnBrk="0" hangingPunct="1">
-                        <a:lnSpc>
-                          <a:spcPct val="100000"/>
-                        </a:lnSpc>
-                        <a:spcBef>
-                          <a:spcPts val="0"/>
-                        </a:spcBef>
-                        <a:spcAft>
-                          <a:spcPts val="0"/>
-                        </a:spcAft>
-                        <a:buClrTx/>
-                        <a:buSzTx/>
-                        <a:buFontTx/>
-                        <a:buNone/>
-                        <a:tabLst/>
-                        <a:defRPr/>
-                      </a:pPr>
-                      <a:r>
-                        <a:rPr lang="en-US" sz="1400" dirty="0" smtClean="0"/>
-                        <a:t>Display this and move on to the next</a:t>
-                      </a:r>
-                      <a:r>
-                        <a:rPr lang="en-US" sz="1400" baseline="0" dirty="0" smtClean="0"/>
-                        <a:t> value for the second number</a:t>
-                      </a:r>
-                      <a:endParaRPr lang="en-US" sz="1400" dirty="0" smtClean="0"/>
-                    </a:p>
-                  </a:txBody>
-                  <a:tcPr/>
-                </a:tc>
-              </a:tr>
-              <a:tr h="444352">
-                <a:tc>
-                  <a:txBody>
-                    <a:bodyPr/>
-                    <a:lstStyle/>
-                    <a:p>
-                      <a:r>
-                        <a:rPr lang="en-US" sz="1400" dirty="0" smtClean="0"/>
-                        <a:t>3</a:t>
-                      </a:r>
-                      <a:endParaRPr lang="en-US" sz="1400" dirty="0"/>
-                    </a:p>
-                  </a:txBody>
-                  <a:tcPr/>
-                </a:tc>
-                <a:tc>
-                  <a:txBody>
-                    <a:bodyPr/>
-                    <a:lstStyle/>
-                    <a:p>
-                      <a:r>
-                        <a:rPr lang="en-US" sz="1400" dirty="0" smtClean="0"/>
-                        <a:t>2</a:t>
-                      </a:r>
-                      <a:endParaRPr lang="en-US" sz="1400" dirty="0"/>
-                    </a:p>
-                  </a:txBody>
-                  <a:tcPr/>
-                </a:tc>
-                <a:tc>
-                  <a:txBody>
-                    <a:bodyPr/>
-                    <a:lstStyle/>
-                    <a:p>
-                      <a:r>
-                        <a:rPr lang="en-US" sz="1400" baseline="0" dirty="0" smtClean="0"/>
-                        <a:t>Positive</a:t>
-                      </a:r>
-                      <a:endParaRPr lang="en-US" sz="1400" dirty="0"/>
-                    </a:p>
-                  </a:txBody>
-                  <a:tcPr/>
-                </a:tc>
-                <a:tc>
-                  <a:txBody>
-                    <a:bodyPr/>
-                    <a:lstStyle/>
-                    <a:p>
-                      <a:pPr marL="0" marR="0" indent="0" algn="l" defTabSz="914400" rtl="0" eaLnBrk="1" fontAlgn="auto" latinLnBrk="0" hangingPunct="1">
-                        <a:lnSpc>
-                          <a:spcPct val="100000"/>
-                        </a:lnSpc>
-                        <a:spcBef>
-                          <a:spcPts val="0"/>
-                        </a:spcBef>
-                        <a:spcAft>
-                          <a:spcPts val="0"/>
-                        </a:spcAft>
-                        <a:buClrTx/>
-                        <a:buSzTx/>
-                        <a:buFontTx/>
-                        <a:buNone/>
-                        <a:tabLst/>
-                        <a:defRPr/>
-                      </a:pPr>
-                      <a:r>
-                        <a:rPr lang="en-US" sz="1400" dirty="0" smtClean="0"/>
-                        <a:t>Display this and move on to the next</a:t>
-                      </a:r>
-                      <a:r>
-                        <a:rPr lang="en-US" sz="1400" baseline="0" dirty="0" smtClean="0"/>
-                        <a:t> value for the second number</a:t>
-                      </a:r>
-                      <a:endParaRPr lang="en-US" sz="1400" dirty="0" smtClean="0"/>
-                    </a:p>
-                  </a:txBody>
-                  <a:tcPr/>
-                </a:tc>
-              </a:tr>
-              <a:tr h="444352">
-                <a:tc>
-                  <a:txBody>
-                    <a:bodyPr/>
-                    <a:lstStyle/>
-                    <a:p>
-                      <a:r>
-                        <a:rPr lang="en-US" sz="1400" dirty="0" smtClean="0"/>
-                        <a:t>3</a:t>
-                      </a:r>
-                      <a:endParaRPr lang="en-US" sz="1400" dirty="0"/>
-                    </a:p>
-                  </a:txBody>
-                  <a:tcPr/>
-                </a:tc>
-                <a:tc>
-                  <a:txBody>
-                    <a:bodyPr/>
-                    <a:lstStyle/>
-                    <a:p>
-                      <a:r>
-                        <a:rPr lang="en-US" sz="1400" dirty="0" smtClean="0"/>
-                        <a:t>3</a:t>
-                      </a:r>
-                      <a:endParaRPr lang="en-US" sz="1400" dirty="0"/>
-                    </a:p>
-                  </a:txBody>
-                  <a:tcPr/>
-                </a:tc>
-                <a:tc>
-                  <a:txBody>
-                    <a:bodyPr/>
-                    <a:lstStyle/>
-                    <a:p>
-                      <a:r>
-                        <a:rPr lang="en-US" sz="1400" dirty="0" smtClean="0"/>
-                        <a:t>Not </a:t>
-                      </a:r>
-                      <a:r>
-                        <a:rPr lang="en-US" sz="1400" baseline="0" dirty="0" smtClean="0"/>
-                        <a:t>Positive</a:t>
-                      </a:r>
-                      <a:endParaRPr lang="en-US" sz="1400" dirty="0"/>
-                    </a:p>
-                  </a:txBody>
-                  <a:tcPr/>
-                </a:tc>
-                <a:tc>
-                  <a:txBody>
-                    <a:bodyPr/>
-                    <a:lstStyle/>
-                    <a:p>
-                      <a:pPr marL="0" marR="0" indent="0" algn="l" defTabSz="914400" rtl="0" eaLnBrk="1" fontAlgn="auto" latinLnBrk="0" hangingPunct="1">
-                        <a:lnSpc>
-                          <a:spcPct val="100000"/>
-                        </a:lnSpc>
-                        <a:spcBef>
-                          <a:spcPts val="0"/>
-                        </a:spcBef>
-                        <a:spcAft>
-                          <a:spcPts val="0"/>
-                        </a:spcAft>
-                        <a:buClrTx/>
-                        <a:buSzTx/>
-                        <a:buFontTx/>
-                        <a:buNone/>
-                        <a:tabLst/>
-                        <a:defRPr/>
-                      </a:pPr>
-                      <a:r>
-                        <a:rPr lang="en-US" sz="1400" dirty="0" smtClean="0"/>
-                        <a:t>Don</a:t>
-                      </a:r>
-                      <a:r>
-                        <a:rPr lang="uk-UA" sz="1400" dirty="0" smtClean="0"/>
-                        <a:t>’</a:t>
-                      </a:r>
-                      <a:r>
-                        <a:rPr lang="en-US" sz="1400" dirty="0" smtClean="0"/>
-                        <a:t>t</a:t>
-                      </a:r>
-                      <a:r>
-                        <a:rPr lang="en-US" sz="1400" baseline="0" dirty="0" smtClean="0"/>
-                        <a:t> display this and move on to the next value for both first and second numbers</a:t>
-                      </a:r>
-                      <a:endParaRPr lang="en-US" sz="1400" dirty="0" smtClean="0"/>
-                    </a:p>
-                  </a:txBody>
-                  <a:tcPr/>
-                </a:tc>
-              </a:tr>
-              <a:tr h="444352">
-                <a:tc>
-                  <a:txBody>
-                    <a:bodyPr/>
-                    <a:lstStyle/>
-                    <a:p>
-                      <a:r>
-                        <a:rPr lang="en-US" sz="1400" dirty="0" smtClean="0"/>
-                        <a:t>4</a:t>
-                      </a:r>
-                      <a:endParaRPr lang="en-US" sz="1400" dirty="0"/>
-                    </a:p>
-                  </a:txBody>
-                  <a:tcPr/>
-                </a:tc>
-                <a:tc>
-                  <a:txBody>
-                    <a:bodyPr/>
-                    <a:lstStyle/>
-                    <a:p>
-                      <a:r>
-                        <a:rPr lang="en-US" sz="1400" dirty="0" smtClean="0"/>
-                        <a:t>1</a:t>
-                      </a:r>
-                      <a:endParaRPr lang="en-US" sz="1400" dirty="0"/>
-                    </a:p>
-                  </a:txBody>
-                  <a:tcPr/>
-                </a:tc>
-                <a:tc>
-                  <a:txBody>
-                    <a:bodyPr/>
-                    <a:lstStyle/>
-                    <a:p>
-                      <a:r>
-                        <a:rPr lang="en-US" sz="1400" baseline="0" dirty="0" smtClean="0"/>
-                        <a:t>Positive</a:t>
-                      </a:r>
-                      <a:endParaRPr lang="en-US" sz="1400" dirty="0"/>
-                    </a:p>
-                  </a:txBody>
-                  <a:tcPr/>
-                </a:tc>
-                <a:tc>
-                  <a:txBody>
-                    <a:bodyPr/>
-                    <a:lstStyle/>
-                    <a:p>
-                      <a:pPr marL="0" marR="0" indent="0" algn="l" defTabSz="914400" rtl="0" eaLnBrk="1" fontAlgn="auto" latinLnBrk="0" hangingPunct="1">
-                        <a:lnSpc>
-                          <a:spcPct val="100000"/>
-                        </a:lnSpc>
-                        <a:spcBef>
-                          <a:spcPts val="0"/>
-                        </a:spcBef>
-                        <a:spcAft>
-                          <a:spcPts val="0"/>
-                        </a:spcAft>
-                        <a:buClrTx/>
-                        <a:buSzTx/>
-                        <a:buFontTx/>
-                        <a:buNone/>
-                        <a:tabLst/>
-                        <a:defRPr/>
-                      </a:pPr>
-                      <a:r>
-                        <a:rPr lang="en-US" sz="1400" dirty="0" smtClean="0"/>
-                        <a:t>Display this and move on to the next</a:t>
-                      </a:r>
-                      <a:r>
-                        <a:rPr lang="en-US" sz="1400" baseline="0" dirty="0" smtClean="0"/>
-                        <a:t> value for the second number</a:t>
-                      </a:r>
-                      <a:endParaRPr lang="en-US" sz="1400" dirty="0" smtClean="0"/>
-                    </a:p>
-                  </a:txBody>
-                  <a:tcPr/>
-                </a:tc>
-              </a:tr>
-            </a:tbl>
-          </a:graphicData>
-        </a:graphic>
-      </p:graphicFrame>
-    </p:spTree>
-    <p:extLst>
-      <p:ext uri="{BB962C8B-B14F-4D97-AF65-F5344CB8AC3E}">
-        <p14:creationId xmlns:p14="http://schemas.microsoft.com/office/powerpoint/2010/main" val="1598012202"/>
-      </p:ext>
-    </p:extLst>
-  </p:cSld>
-  <p:clrMapOvr>
-    <a:masterClrMapping/>
-  </p:clrMapOvr>
-</p:sld>
-</file>
-
-<file path=ppt/slides/slide17.xml><?xml version="1.0" encoding="utf-8"?>
-<p:sld xmlns:a="http://schemas.openxmlformats.org/drawingml/2006/main" xmlns:r="http://schemas.openxmlformats.org/officeDocument/2006/relationships" xmlns:p="http://schemas.openxmlformats.org/presentationml/2006/main">
-  <p:cSld>
-    <p:spTree>
-      <p:nvGrpSpPr>
-        <p:cNvPr id="1" name=""/>
-        <p:cNvGrpSpPr/>
-        <p:nvPr/>
-      </p:nvGrpSpPr>
-      <p:grpSpPr>
-        <a:xfrm>
-          <a:off x="0" y="0"/>
-          <a:ext cx="0" cy="0"/>
-          <a:chOff x="0" y="0"/>
-          <a:chExt cx="0" cy="0"/>
-        </a:xfrm>
-      </p:grpSpPr>
-      <p:sp>
-        <p:nvSpPr>
-          <p:cNvPr id="2" name="Title 1"/>
-          <p:cNvSpPr>
-            <a:spLocks noGrp="1"/>
-          </p:cNvSpPr>
-          <p:nvPr>
-            <p:ph type="title"/>
-          </p:nvPr>
-        </p:nvSpPr>
-        <p:spPr/>
-        <p:txBody>
-          <a:bodyPr/>
-          <a:lstStyle/>
-          <a:p>
-            <a:r>
-              <a:rPr lang="en-US" dirty="0" smtClean="0"/>
               <a:t>Scope</a:t>
             </a:r>
             <a:endParaRPr lang="en-US" dirty="0"/>
@@ -5077,7 +4222,7 @@
 </p:sld>
 </file>
 
-<file path=ppt/slides/slide18.xml><?xml version="1.0" encoding="utf-8"?>
+<file path=ppt/slides/slide16.xml><?xml version="1.0" encoding="utf-8"?>
 <p:sld xmlns:a="http://schemas.openxmlformats.org/drawingml/2006/main" xmlns:r="http://schemas.openxmlformats.org/officeDocument/2006/relationships" xmlns:p="http://schemas.openxmlformats.org/presentationml/2006/main">
   <p:cSld>
     <p:spTree>

</xml_diff>

<commit_message>
week 02: update slides
</commit_message>
<xml_diff>
--- a/week_02/week_02.pptx
+++ b/week_02/week_02.pptx
@@ -212,7 +212,7 @@
           <a:p>
             <a:fld id="{1F477659-4330-8D48-9D0A-D1EC371753DE}" type="datetimeFigureOut">
               <a:rPr lang="en-US" smtClean="0"/>
-              <a:t>9/5/16</a:t>
+              <a:t>1/24/17</a:t>
             </a:fld>
             <a:endParaRPr lang="en-US"/>
           </a:p>
@@ -732,7 +732,7 @@
           <a:p>
             <a:fld id="{07BE59C9-83CC-5B44-BBFE-D955AC939C7E}" type="datetime1">
               <a:rPr lang="en-US" smtClean="0"/>
-              <a:t>9/5/16</a:t>
+              <a:t>1/24/17</a:t>
             </a:fld>
             <a:endParaRPr lang="en-US" dirty="0"/>
           </a:p>
@@ -956,7 +956,7 @@
           <a:p>
             <a:fld id="{62BC4CC6-DD30-7D48-84D0-539AC705EAC4}" type="datetime1">
               <a:rPr lang="en-US" smtClean="0"/>
-              <a:t>9/5/16</a:t>
+              <a:t>1/24/17</a:t>
             </a:fld>
             <a:endParaRPr lang="en-US" dirty="0"/>
           </a:p>
@@ -1131,7 +1131,7 @@
           <a:p>
             <a:fld id="{F38A617F-EF95-6D47-92FC-7E9C8066D030}" type="datetime1">
               <a:rPr lang="en-US" smtClean="0"/>
-              <a:t>9/5/16</a:t>
+              <a:t>1/24/17</a:t>
             </a:fld>
             <a:endParaRPr lang="en-US" dirty="0"/>
           </a:p>
@@ -1296,7 +1296,7 @@
           <a:p>
             <a:fld id="{140256AF-76BB-8D4A-8C06-C76A9886ED36}" type="datetime1">
               <a:rPr lang="en-US" smtClean="0"/>
-              <a:t>9/5/16</a:t>
+              <a:t>1/24/17</a:t>
             </a:fld>
             <a:endParaRPr lang="en-US" dirty="0"/>
           </a:p>
@@ -1545,7 +1545,7 @@
           <a:p>
             <a:fld id="{36035C57-A3EA-7441-AF66-FF654E99E143}" type="datetime1">
               <a:rPr lang="en-US" smtClean="0"/>
-              <a:t>9/5/16</a:t>
+              <a:t>1/24/17</a:t>
             </a:fld>
             <a:endParaRPr lang="en-US" dirty="0"/>
           </a:p>
@@ -1866,7 +1866,7 @@
           <a:p>
             <a:fld id="{C099BAF3-00D8-7F4F-8094-EAA1867C9802}" type="datetime1">
               <a:rPr lang="en-US" smtClean="0"/>
-              <a:t>9/5/16</a:t>
+              <a:t>1/24/17</a:t>
             </a:fld>
             <a:endParaRPr lang="en-US" dirty="0"/>
           </a:p>
@@ -2312,7 +2312,7 @@
           <a:p>
             <a:fld id="{C31EB968-4A0B-D24B-9439-4ED531E7FA29}" type="datetime1">
               <a:rPr lang="en-US" smtClean="0"/>
-              <a:t>9/5/16</a:t>
+              <a:t>1/24/17</a:t>
             </a:fld>
             <a:endParaRPr lang="en-US" dirty="0"/>
           </a:p>
@@ -2425,7 +2425,7 @@
           <a:p>
             <a:fld id="{7ED3D1D9-27FB-4D4E-BDCA-8F593F92C3A2}" type="datetime1">
               <a:rPr lang="en-US" smtClean="0"/>
-              <a:t>9/5/16</a:t>
+              <a:t>1/24/17</a:t>
             </a:fld>
             <a:endParaRPr lang="en-US" dirty="0"/>
           </a:p>
@@ -2515,7 +2515,7 @@
           <a:p>
             <a:fld id="{1278E4F9-F749-2843-B738-2A530CD029E2}" type="datetime1">
               <a:rPr lang="en-US" smtClean="0"/>
-              <a:t>9/5/16</a:t>
+              <a:t>1/24/17</a:t>
             </a:fld>
             <a:endParaRPr lang="en-US" dirty="0"/>
           </a:p>
@@ -2797,7 +2797,7 @@
           <a:p>
             <a:fld id="{841787D4-A450-4641-8D89-087B793C9176}" type="datetime1">
               <a:rPr lang="en-US" smtClean="0"/>
-              <a:t>9/5/16</a:t>
+              <a:t>1/24/17</a:t>
             </a:fld>
             <a:endParaRPr lang="en-US" dirty="0"/>
           </a:p>
@@ -3117,7 +3117,7 @@
           <a:p>
             <a:fld id="{1D1BACEC-84F6-CA46-936F-4DFFE6BEFBDA}" type="datetime1">
               <a:rPr lang="en-US" smtClean="0"/>
-              <a:t>9/5/16</a:t>
+              <a:t>1/24/17</a:t>
             </a:fld>
             <a:endParaRPr lang="en-US" dirty="0"/>
           </a:p>
@@ -3366,7 +3366,7 @@
           <a:p>
             <a:fld id="{9637FC44-D635-7B4C-B3B2-8D825E9FC50F}" type="datetime1">
               <a:rPr lang="en-US" smtClean="0"/>
-              <a:t>9/5/16</a:t>
+              <a:t>1/24/17</a:t>
             </a:fld>
             <a:endParaRPr lang="en-US" dirty="0"/>
           </a:p>
@@ -4264,7 +4264,9 @@
         </p:nvSpPr>
         <p:spPr/>
         <p:txBody>
-          <a:bodyPr/>
+          <a:bodyPr>
+            <a:normAutofit lnSpcReduction="10000"/>
+          </a:bodyPr>
           <a:lstStyle/>
           <a:p>
             <a:fld id="{4FAB73BC-B049-4115-A692-8D63A059BFB8}" type="slidenum">
@@ -4459,7 +4461,9 @@
         </p:nvSpPr>
         <p:spPr/>
         <p:txBody>
-          <a:bodyPr/>
+          <a:bodyPr>
+            <a:normAutofit lnSpcReduction="10000"/>
+          </a:bodyPr>
           <a:lstStyle/>
           <a:p>
             <a:fld id="{4FAB73BC-B049-4115-A692-8D63A059BFB8}" type="slidenum">
@@ -4578,7 +4582,9 @@
         </p:nvSpPr>
         <p:spPr/>
         <p:txBody>
-          <a:bodyPr/>
+          <a:bodyPr>
+            <a:normAutofit lnSpcReduction="10000"/>
+          </a:bodyPr>
           <a:lstStyle/>
           <a:p>
             <a:fld id="{4FAB73BC-B049-4115-A692-8D63A059BFB8}" type="slidenum">
@@ -4687,7 +4693,9 @@
         </p:nvSpPr>
         <p:spPr/>
         <p:txBody>
-          <a:bodyPr/>
+          <a:bodyPr>
+            <a:normAutofit lnSpcReduction="10000"/>
+          </a:bodyPr>
           <a:lstStyle/>
           <a:p>
             <a:fld id="{4FAB73BC-B049-4115-A692-8D63A059BFB8}" type="slidenum">
@@ -4799,7 +4807,9 @@
         </p:nvSpPr>
         <p:spPr/>
         <p:txBody>
-          <a:bodyPr/>
+          <a:bodyPr>
+            <a:normAutofit lnSpcReduction="10000"/>
+          </a:bodyPr>
           <a:lstStyle/>
           <a:p>
             <a:fld id="{4FAB73BC-B049-4115-A692-8D63A059BFB8}" type="slidenum">
@@ -5039,7 +5049,9 @@
         </p:nvSpPr>
         <p:spPr/>
         <p:txBody>
-          <a:bodyPr/>
+          <a:bodyPr>
+            <a:normAutofit lnSpcReduction="10000"/>
+          </a:bodyPr>
           <a:lstStyle/>
           <a:p>
             <a:fld id="{4FAB73BC-B049-4115-A692-8D63A059BFB8}" type="slidenum">
@@ -5210,9 +5222,92 @@
           </a:p>
         </p:txBody>
       </p:sp>
+      <p:sp>
+        <p:nvSpPr>
+          <p:cNvPr id="6" name="Content Placeholder 5"/>
+          <p:cNvSpPr>
+            <a:spLocks noGrp="1"/>
+          </p:cNvSpPr>
+          <p:nvPr>
+            <p:ph sz="half" idx="2"/>
+          </p:nvPr>
+        </p:nvSpPr>
+        <p:spPr/>
+        <p:txBody>
+          <a:bodyPr anchor="ctr">
+            <a:normAutofit/>
+          </a:bodyPr>
+          <a:lstStyle/>
+          <a:p>
+            <a:r>
+              <a:rPr lang="en-US" sz="2400" dirty="0" smtClean="0"/>
+              <a:t>Want to keep last week’s code</a:t>
+            </a:r>
+          </a:p>
+          <a:p>
+            <a:r>
+              <a:rPr lang="en-US" sz="2400" dirty="0" smtClean="0"/>
+              <a:t>Create a new </a:t>
+            </a:r>
+            <a:r>
+              <a:rPr lang="en-US" sz="2400" dirty="0" smtClean="0"/>
+              <a:t>package within </a:t>
+            </a:r>
+            <a:r>
+              <a:rPr lang="en-US" sz="2400" dirty="0" smtClean="0"/>
+              <a:t>the existing project for this week’s code</a:t>
+            </a:r>
+          </a:p>
+          <a:p>
+            <a:r>
+              <a:rPr lang="en-US" sz="2400" dirty="0" smtClean="0"/>
+              <a:t>Create </a:t>
+            </a:r>
+            <a:r>
+              <a:rPr lang="en-US" sz="2400" dirty="0" smtClean="0"/>
+              <a:t>a </a:t>
+            </a:r>
+            <a:r>
+              <a:rPr lang="en-US" sz="2400" dirty="0" smtClean="0"/>
+              <a:t>Java class file for the new module</a:t>
+            </a:r>
+          </a:p>
+          <a:p>
+            <a:r>
+              <a:rPr lang="en-US" sz="2400" dirty="0" smtClean="0"/>
+              <a:t>Update run configurations to easily run our new code</a:t>
+            </a:r>
+          </a:p>
+        </p:txBody>
+      </p:sp>
+      <p:sp>
+        <p:nvSpPr>
+          <p:cNvPr id="2" name="Slide Number Placeholder 1"/>
+          <p:cNvSpPr>
+            <a:spLocks noGrp="1"/>
+          </p:cNvSpPr>
+          <p:nvPr>
+            <p:ph type="sldNum" sz="quarter" idx="12"/>
+          </p:nvPr>
+        </p:nvSpPr>
+        <p:spPr/>
+        <p:txBody>
+          <a:bodyPr>
+            <a:normAutofit lnSpcReduction="10000"/>
+          </a:bodyPr>
+          <a:lstStyle/>
+          <a:p>
+            <a:fld id="{4FAB73BC-B049-4115-A692-8D63A059BFB8}" type="slidenum">
+              <a:rPr lang="en-US" smtClean="0"/>
+              <a:t>3</a:t>
+            </a:fld>
+            <a:endParaRPr lang="en-US" dirty="0"/>
+          </a:p>
+        </p:txBody>
+      </p:sp>
       <p:pic>
         <p:nvPicPr>
-          <p:cNvPr id="7" name="Content Placeholder 6"/>
+          <p:cNvPr id="5" name="Content Placeholder 4"/>
           <p:cNvPicPr>
             <a:picLocks noGrp="1" noChangeAspect="1"/>
           </p:cNvPicPr>
@@ -5234,78 +5329,11 @@
         </p:blipFill>
         <p:spPr>
           <a:xfrm>
-            <a:off x="1565275" y="2182019"/>
-            <a:ext cx="3873500" cy="3644900"/>
+            <a:off x="1336675" y="2721769"/>
+            <a:ext cx="4330700" cy="2565400"/>
           </a:xfrm>
         </p:spPr>
       </p:pic>
-      <p:sp>
-        <p:nvSpPr>
-          <p:cNvPr id="6" name="Content Placeholder 5"/>
-          <p:cNvSpPr>
-            <a:spLocks noGrp="1"/>
-          </p:cNvSpPr>
-          <p:nvPr>
-            <p:ph sz="half" idx="2"/>
-          </p:nvPr>
-        </p:nvSpPr>
-        <p:spPr/>
-        <p:txBody>
-          <a:bodyPr anchor="ctr">
-            <a:normAutofit/>
-          </a:bodyPr>
-          <a:lstStyle/>
-          <a:p>
-            <a:r>
-              <a:rPr lang="en-US" sz="2400" dirty="0" smtClean="0"/>
-              <a:t>Want to keep last week’s code</a:t>
-            </a:r>
-          </a:p>
-          <a:p>
-            <a:r>
-              <a:rPr lang="en-US" sz="2400" dirty="0" smtClean="0"/>
-              <a:t>Create a new module within the existing project for this week’s code</a:t>
-            </a:r>
-          </a:p>
-          <a:p>
-            <a:r>
-              <a:rPr lang="en-US" sz="2400" dirty="0" smtClean="0"/>
-              <a:t>Create a package and Java class file for the new module</a:t>
-            </a:r>
-          </a:p>
-          <a:p>
-            <a:r>
-              <a:rPr lang="en-US" sz="2400" dirty="0" smtClean="0"/>
-              <a:t>Update run configurations to easily run our new code</a:t>
-            </a:r>
-          </a:p>
-        </p:txBody>
-      </p:sp>
-      <p:sp>
-        <p:nvSpPr>
-          <p:cNvPr id="2" name="Slide Number Placeholder 1"/>
-          <p:cNvSpPr>
-            <a:spLocks noGrp="1"/>
-          </p:cNvSpPr>
-          <p:nvPr>
-            <p:ph type="sldNum" sz="quarter" idx="12"/>
-          </p:nvPr>
-        </p:nvSpPr>
-        <p:spPr/>
-        <p:txBody>
-          <a:bodyPr>
-            <a:normAutofit lnSpcReduction="10000"/>
-          </a:bodyPr>
-          <a:lstStyle/>
-          <a:p>
-            <a:fld id="{4FAB73BC-B049-4115-A692-8D63A059BFB8}" type="slidenum">
-              <a:rPr lang="en-US" smtClean="0"/>
-              <a:t>3</a:t>
-            </a:fld>
-            <a:endParaRPr lang="en-US" dirty="0"/>
-          </a:p>
-        </p:txBody>
-      </p:sp>
     </p:spTree>
     <p:extLst>
       <p:ext uri="{BB962C8B-B14F-4D97-AF65-F5344CB8AC3E}">

</xml_diff>